<commit_message>
New ppt & instructions + data
</commit_message>
<xml_diff>
--- a/NewTasks/Before Scan 1. Briefing.pptx
+++ b/NewTasks/Before Scan 1. Briefing.pptx
@@ -5,7 +5,7 @@
     <p:sldMasterId id="2147483648" r:id="rId4"/>
   </p:sldMasterIdLst>
   <p:notesMasterIdLst>
-    <p:notesMasterId r:id="rId40"/>
+    <p:notesMasterId r:id="rId41"/>
   </p:notesMasterIdLst>
   <p:sldIdLst>
     <p:sldId id="320" r:id="rId5"/>
@@ -41,8 +41,9 @@
     <p:sldId id="288" r:id="rId35"/>
     <p:sldId id="315" r:id="rId36"/>
     <p:sldId id="298" r:id="rId37"/>
-    <p:sldId id="318" r:id="rId38"/>
-    <p:sldId id="289" r:id="rId39"/>
+    <p:sldId id="332" r:id="rId38"/>
+    <p:sldId id="318" r:id="rId39"/>
+    <p:sldId id="289" r:id="rId40"/>
   </p:sldIdLst>
   <p:sldSz cx="12192000" cy="6858000"/>
   <p:notesSz cx="6858000" cy="9144000"/>
@@ -239,7 +240,7 @@
           <a:p>
             <a:fld id="{980E24A7-9954-5B4D-976B-6D28026BE577}" type="datetimeFigureOut">
               <a:rPr lang="en-US" smtClean="0"/>
-              <a:t>12/13/23</a:t>
+              <a:t>12/14/23</a:t>
             </a:fld>
             <a:endParaRPr lang="en-US"/>
           </a:p>
@@ -2528,7 +2529,7 @@
           <a:p>
             <a:fld id="{9D47736A-4A47-5E49-B435-20FECFFD9B20}" type="datetimeFigureOut">
               <a:rPr lang="en-US" smtClean="0"/>
-              <a:t>12/13/23</a:t>
+              <a:t>12/14/23</a:t>
             </a:fld>
             <a:endParaRPr lang="en-US"/>
           </a:p>
@@ -2728,7 +2729,7 @@
           <a:p>
             <a:fld id="{9D47736A-4A47-5E49-B435-20FECFFD9B20}" type="datetimeFigureOut">
               <a:rPr lang="en-US" smtClean="0"/>
-              <a:t>12/13/23</a:t>
+              <a:t>12/14/23</a:t>
             </a:fld>
             <a:endParaRPr lang="en-US"/>
           </a:p>
@@ -2938,7 +2939,7 @@
           <a:p>
             <a:fld id="{9D47736A-4A47-5E49-B435-20FECFFD9B20}" type="datetimeFigureOut">
               <a:rPr lang="en-US" smtClean="0"/>
-              <a:t>12/13/23</a:t>
+              <a:t>12/14/23</a:t>
             </a:fld>
             <a:endParaRPr lang="en-US"/>
           </a:p>
@@ -3138,7 +3139,7 @@
           <a:p>
             <a:fld id="{9D47736A-4A47-5E49-B435-20FECFFD9B20}" type="datetimeFigureOut">
               <a:rPr lang="en-US" smtClean="0"/>
-              <a:t>12/13/23</a:t>
+              <a:t>12/14/23</a:t>
             </a:fld>
             <a:endParaRPr lang="en-US"/>
           </a:p>
@@ -3414,7 +3415,7 @@
           <a:p>
             <a:fld id="{9D47736A-4A47-5E49-B435-20FECFFD9B20}" type="datetimeFigureOut">
               <a:rPr lang="en-US" smtClean="0"/>
-              <a:t>12/13/23</a:t>
+              <a:t>12/14/23</a:t>
             </a:fld>
             <a:endParaRPr lang="en-US"/>
           </a:p>
@@ -3682,7 +3683,7 @@
           <a:p>
             <a:fld id="{9D47736A-4A47-5E49-B435-20FECFFD9B20}" type="datetimeFigureOut">
               <a:rPr lang="en-US" smtClean="0"/>
-              <a:t>12/13/23</a:t>
+              <a:t>12/14/23</a:t>
             </a:fld>
             <a:endParaRPr lang="en-US"/>
           </a:p>
@@ -4097,7 +4098,7 @@
           <a:p>
             <a:fld id="{9D47736A-4A47-5E49-B435-20FECFFD9B20}" type="datetimeFigureOut">
               <a:rPr lang="en-US" smtClean="0"/>
-              <a:t>12/13/23</a:t>
+              <a:t>12/14/23</a:t>
             </a:fld>
             <a:endParaRPr lang="en-US"/>
           </a:p>
@@ -4239,7 +4240,7 @@
           <a:p>
             <a:fld id="{9D47736A-4A47-5E49-B435-20FECFFD9B20}" type="datetimeFigureOut">
               <a:rPr lang="en-US" smtClean="0"/>
-              <a:t>12/13/23</a:t>
+              <a:t>12/14/23</a:t>
             </a:fld>
             <a:endParaRPr lang="en-US"/>
           </a:p>
@@ -4352,7 +4353,7 @@
           <a:p>
             <a:fld id="{9D47736A-4A47-5E49-B435-20FECFFD9B20}" type="datetimeFigureOut">
               <a:rPr lang="en-US" smtClean="0"/>
-              <a:t>12/13/23</a:t>
+              <a:t>12/14/23</a:t>
             </a:fld>
             <a:endParaRPr lang="en-US"/>
           </a:p>
@@ -4665,7 +4666,7 @@
           <a:p>
             <a:fld id="{9D47736A-4A47-5E49-B435-20FECFFD9B20}" type="datetimeFigureOut">
               <a:rPr lang="en-US" smtClean="0"/>
-              <a:t>12/13/23</a:t>
+              <a:t>12/14/23</a:t>
             </a:fld>
             <a:endParaRPr lang="en-US"/>
           </a:p>
@@ -4954,7 +4955,7 @@
           <a:p>
             <a:fld id="{9D47736A-4A47-5E49-B435-20FECFFD9B20}" type="datetimeFigureOut">
               <a:rPr lang="en-US" smtClean="0"/>
-              <a:t>12/13/23</a:t>
+              <a:t>12/14/23</a:t>
             </a:fld>
             <a:endParaRPr lang="en-US"/>
           </a:p>
@@ -5197,7 +5198,7 @@
           <a:p>
             <a:fld id="{9D47736A-4A47-5E49-B435-20FECFFD9B20}" type="datetimeFigureOut">
               <a:rPr lang="en-US" smtClean="0"/>
-              <a:t>12/13/23</a:t>
+              <a:t>12/14/23</a:t>
             </a:fld>
             <a:endParaRPr lang="en-US"/>
           </a:p>
@@ -14502,7 +14503,7 @@
         <p:spPr>
           <a:xfrm>
             <a:off x="283026" y="1520244"/>
-            <a:ext cx="11632488" cy="3785652"/>
+            <a:ext cx="11527974" cy="4708981"/>
           </a:xfrm>
           <a:prstGeom prst="rect">
             <a:avLst/>
@@ -14520,7 +14521,7 @@
                 <a:latin typeface="Bangla MN" pitchFamily="2" charset="0"/>
                 <a:cs typeface="Bangla MN" pitchFamily="2" charset="0"/>
               </a:rPr>
-              <a:t>You will play 3 rounds total of this game. Each round takes about 10 minutes.</a:t>
+              <a:t>You will start the session with a 2-minute picture game, where all you need to do is stay still in the scanner.</a:t>
             </a:r>
           </a:p>
           <a:p>
@@ -14535,7 +14536,7 @@
                 <a:latin typeface="Bangla MN" pitchFamily="2" charset="0"/>
                 <a:cs typeface="Bangla MN" pitchFamily="2" charset="0"/>
               </a:rPr>
-              <a:t>We will check in with you after each round to see how you’re doing.</a:t>
+              <a:t>You will then undergo a 7-minute scan. Meanwhile, you will go through the instructions about another game that you will play while in the scanner.</a:t>
             </a:r>
           </a:p>
           <a:p>
@@ -14550,7 +14551,7 @@
                 <a:latin typeface="Bangla MN" pitchFamily="2" charset="0"/>
                 <a:cs typeface="Bangla MN" pitchFamily="2" charset="0"/>
               </a:rPr>
-              <a:t>You will start the session with a 7-minute scan where we take a picture of your brain. Meanwhile, you will go through the instructions about another game that you will be playing in the scanner. </a:t>
+              <a:t>The instructions might finish earlier than the scanning process, please wait until we speak to you.</a:t>
             </a:r>
           </a:p>
           <a:p>
@@ -14580,21 +14581,22 @@
                 <a:latin typeface="Bangla MN" pitchFamily="2" charset="0"/>
                 <a:cs typeface="Bangla MN" pitchFamily="2" charset="0"/>
               </a:rPr>
-              <a:t>It is very important that you </a:t>
-            </a:r>
-            <a:r>
-              <a:rPr lang="en-US" sz="2000" b="1" dirty="0">
-                <a:latin typeface="Bangla MN" pitchFamily="2" charset="0"/>
-                <a:cs typeface="Bangla MN" pitchFamily="2" charset="0"/>
-              </a:rPr>
-              <a:t>hold still in the scanner </a:t>
-            </a:r>
+              <a:t>After that, you will play another 2-minute picture game.</a:t>
+            </a:r>
+          </a:p>
+          <a:p>
+            <a:endParaRPr lang="en-US" sz="2000" dirty="0">
+              <a:latin typeface="Bangla MN" pitchFamily="2" charset="0"/>
+              <a:cs typeface="Bangla MN" pitchFamily="2" charset="0"/>
+            </a:endParaRPr>
+          </a:p>
+          <a:p>
             <a:r>
               <a:rPr lang="en-US" sz="2000" dirty="0">
                 <a:latin typeface="Bangla MN" pitchFamily="2" charset="0"/>
                 <a:cs typeface="Bangla MN" pitchFamily="2" charset="0"/>
               </a:rPr>
-              <a:t>because any small movements can blur the pictures.</a:t>
+              <a:t>You will then play 3 rounds of  the survival game introduced in this ppt.  Each round takes about 10 minutes.</a:t>
             </a:r>
           </a:p>
         </p:txBody>
@@ -14735,6 +14737,209 @@
           </a:p>
         </p:txBody>
       </p:sp>
+      <p:sp>
+        <p:nvSpPr>
+          <p:cNvPr id="8" name="TextBox 7">
+            <a:extLst>
+              <a:ext uri="{FF2B5EF4-FFF2-40B4-BE49-F238E27FC236}">
+                <a16:creationId xmlns:a16="http://schemas.microsoft.com/office/drawing/2014/main" id="{8C6C289F-44DC-B74A-5B96-78652F9DCA83}"/>
+              </a:ext>
+            </a:extLst>
+          </p:cNvPr>
+          <p:cNvSpPr txBox="1"/>
+          <p:nvPr/>
+        </p:nvSpPr>
+        <p:spPr>
+          <a:xfrm>
+            <a:off x="283026" y="1520244"/>
+            <a:ext cx="11426374" cy="1323439"/>
+          </a:xfrm>
+          <a:prstGeom prst="rect">
+            <a:avLst/>
+          </a:prstGeom>
+          <a:noFill/>
+        </p:spPr>
+        <p:txBody>
+          <a:bodyPr wrap="square" rtlCol="0">
+            <a:spAutoFit/>
+          </a:bodyPr>
+          <a:lstStyle/>
+          <a:p>
+            <a:r>
+              <a:rPr lang="en-US" sz="2000" dirty="0">
+                <a:latin typeface="Bangla MN" pitchFamily="2" charset="0"/>
+                <a:cs typeface="Bangla MN" pitchFamily="2" charset="0"/>
+              </a:rPr>
+              <a:t>We will check in with you after each round to see how you’re doing.</a:t>
+            </a:r>
+          </a:p>
+          <a:p>
+            <a:endParaRPr lang="en-US" sz="2000" dirty="0">
+              <a:latin typeface="Bangla MN" pitchFamily="2" charset="0"/>
+              <a:cs typeface="Bangla MN" pitchFamily="2" charset="0"/>
+            </a:endParaRPr>
+          </a:p>
+          <a:p>
+            <a:r>
+              <a:rPr lang="en-US" sz="2000" dirty="0">
+                <a:latin typeface="Bangla MN" pitchFamily="2" charset="0"/>
+                <a:cs typeface="Bangla MN" pitchFamily="2" charset="0"/>
+              </a:rPr>
+              <a:t>It is very important that you </a:t>
+            </a:r>
+            <a:r>
+              <a:rPr lang="en-US" sz="2000" b="1" dirty="0">
+                <a:latin typeface="Bangla MN" pitchFamily="2" charset="0"/>
+                <a:cs typeface="Bangla MN" pitchFamily="2" charset="0"/>
+              </a:rPr>
+              <a:t>hold still in the scanner </a:t>
+            </a:r>
+            <a:r>
+              <a:rPr lang="en-US" sz="2000" dirty="0">
+                <a:latin typeface="Bangla MN" pitchFamily="2" charset="0"/>
+                <a:cs typeface="Bangla MN" pitchFamily="2" charset="0"/>
+              </a:rPr>
+              <a:t>because any small movements can blur the pictures.</a:t>
+            </a:r>
+          </a:p>
+        </p:txBody>
+      </p:sp>
+      <p:pic>
+        <p:nvPicPr>
+          <p:cNvPr id="10" name="Picture 9">
+            <a:extLst>
+              <a:ext uri="{FF2B5EF4-FFF2-40B4-BE49-F238E27FC236}">
+                <a16:creationId xmlns:a16="http://schemas.microsoft.com/office/drawing/2014/main" id="{B943BA87-48F5-F745-BA42-1639AF586CBC}"/>
+              </a:ext>
+            </a:extLst>
+          </p:cNvPr>
+          <p:cNvPicPr>
+            <a:picLocks noChangeAspect="1"/>
+          </p:cNvPicPr>
+          <p:nvPr/>
+        </p:nvPicPr>
+        <p:blipFill rotWithShape="1">
+          <a:blip r:embed="rId2"/>
+          <a:srcRect b="6186"/>
+          <a:stretch/>
+        </p:blipFill>
+        <p:spPr>
+          <a:xfrm>
+            <a:off x="10626793" y="0"/>
+            <a:ext cx="1565207" cy="1468390"/>
+          </a:xfrm>
+          <a:prstGeom prst="rect">
+            <a:avLst/>
+          </a:prstGeom>
+        </p:spPr>
+      </p:pic>
+      <p:sp>
+        <p:nvSpPr>
+          <p:cNvPr id="13" name="TextBox 12">
+            <a:extLst>
+              <a:ext uri="{FF2B5EF4-FFF2-40B4-BE49-F238E27FC236}">
+                <a16:creationId xmlns:a16="http://schemas.microsoft.com/office/drawing/2014/main" id="{7285CC5B-1369-D54A-A93C-A7AD9ED0E1DD}"/>
+              </a:ext>
+            </a:extLst>
+          </p:cNvPr>
+          <p:cNvSpPr txBox="1"/>
+          <p:nvPr/>
+        </p:nvSpPr>
+        <p:spPr>
+          <a:xfrm>
+            <a:off x="9266732" y="6596767"/>
+            <a:ext cx="3132405" cy="261610"/>
+          </a:xfrm>
+          <a:prstGeom prst="rect">
+            <a:avLst/>
+          </a:prstGeom>
+          <a:noFill/>
+        </p:spPr>
+        <p:txBody>
+          <a:bodyPr wrap="square" rtlCol="0">
+            <a:spAutoFit/>
+          </a:bodyPr>
+          <a:lstStyle/>
+          <a:p>
+            <a:pPr algn="ctr"/>
+            <a:r>
+              <a:rPr lang="en-US" sz="1100" dirty="0">
+                <a:latin typeface="Bangla MN" pitchFamily="2" charset="0"/>
+                <a:cs typeface="Bangla MN" pitchFamily="2" charset="0"/>
+              </a:rPr>
+              <a:t>Ethics Number: 2023-27613-44212-3</a:t>
+            </a:r>
+          </a:p>
+        </p:txBody>
+      </p:sp>
+    </p:spTree>
+    <p:extLst>
+      <p:ext uri="{BB962C8B-B14F-4D97-AF65-F5344CB8AC3E}">
+        <p14:creationId xmlns:p14="http://schemas.microsoft.com/office/powerpoint/2010/main" val="3188327414"/>
+      </p:ext>
+    </p:extLst>
+  </p:cSld>
+  <p:clrMapOvr>
+    <a:masterClrMapping/>
+  </p:clrMapOvr>
+</p:sld>
+</file>
+
+<file path=ppt/slides/slide35.xml><?xml version="1.0" encoding="utf-8"?>
+<p:sld xmlns:a="http://schemas.openxmlformats.org/drawingml/2006/main" xmlns:r="http://schemas.openxmlformats.org/officeDocument/2006/relationships" xmlns:p="http://schemas.openxmlformats.org/presentationml/2006/main">
+  <p:cSld>
+    <p:spTree>
+      <p:nvGrpSpPr>
+        <p:cNvPr id="1" name=""/>
+        <p:cNvGrpSpPr/>
+        <p:nvPr/>
+      </p:nvGrpSpPr>
+      <p:grpSpPr>
+        <a:xfrm>
+          <a:off x="0" y="0"/>
+          <a:ext cx="0" cy="0"/>
+          <a:chOff x="0" y="0"/>
+          <a:chExt cx="0" cy="0"/>
+        </a:xfrm>
+      </p:grpSpPr>
+      <p:sp>
+        <p:nvSpPr>
+          <p:cNvPr id="4" name="TextBox 3">
+            <a:extLst>
+              <a:ext uri="{FF2B5EF4-FFF2-40B4-BE49-F238E27FC236}">
+                <a16:creationId xmlns:a16="http://schemas.microsoft.com/office/drawing/2014/main" id="{C7B648B4-3C2F-E534-B2B1-776C3D057260}"/>
+              </a:ext>
+            </a:extLst>
+          </p:cNvPr>
+          <p:cNvSpPr txBox="1"/>
+          <p:nvPr/>
+        </p:nvSpPr>
+        <p:spPr>
+          <a:xfrm>
+            <a:off x="283026" y="440744"/>
+            <a:ext cx="7222674" cy="553998"/>
+          </a:xfrm>
+          <a:prstGeom prst="rect">
+            <a:avLst/>
+          </a:prstGeom>
+          <a:noFill/>
+        </p:spPr>
+        <p:txBody>
+          <a:bodyPr wrap="square" rtlCol="0">
+            <a:spAutoFit/>
+          </a:bodyPr>
+          <a:lstStyle/>
+          <a:p>
+            <a:r>
+              <a:rPr lang="en-US" sz="3000" dirty="0">
+                <a:latin typeface="Bangla MN" pitchFamily="2" charset="0"/>
+                <a:cs typeface="Bangla MN" pitchFamily="2" charset="0"/>
+              </a:rPr>
+              <a:t>Session Information</a:t>
+            </a:r>
+          </a:p>
+        </p:txBody>
+      </p:sp>
       <p:pic>
         <p:nvPicPr>
           <p:cNvPr id="10" name="Picture 9">
@@ -15491,7 +15696,7 @@
 </p:sld>
 </file>
 
-<file path=ppt/slides/slide35.xml><?xml version="1.0" encoding="utf-8"?>
+<file path=ppt/slides/slide36.xml><?xml version="1.0" encoding="utf-8"?>
 <p:sld xmlns:a="http://schemas.openxmlformats.org/drawingml/2006/main" xmlns:r="http://schemas.openxmlformats.org/officeDocument/2006/relationships" xmlns:p="http://schemas.openxmlformats.org/presentationml/2006/main">
   <p:cSld>
     <p:spTree>
@@ -16529,7 +16734,7 @@
         <p:spPr>
           <a:xfrm>
             <a:off x="283026" y="1520244"/>
-            <a:ext cx="11632488" cy="2554545"/>
+            <a:ext cx="11632488" cy="3170099"/>
           </a:xfrm>
           <a:prstGeom prst="rect">
             <a:avLst/>
@@ -16565,6 +16770,41 @@
                 <a:cs typeface="Bangla MN" pitchFamily="2" charset="0"/>
               </a:rPr>
               <a:t>, as even slight movements can blur the images of your brain.</a:t>
+            </a:r>
+          </a:p>
+          <a:p>
+            <a:pPr marL="0" indent="0" fontAlgn="base">
+              <a:buNone/>
+            </a:pPr>
+            <a:endParaRPr lang="en-AU" sz="2000" dirty="0">
+              <a:latin typeface="Bangla MN" pitchFamily="2" charset="0"/>
+              <a:cs typeface="Bangla MN" pitchFamily="2" charset="0"/>
+            </a:endParaRPr>
+          </a:p>
+          <a:p>
+            <a:pPr marL="0" indent="0" fontAlgn="base">
+              <a:buNone/>
+            </a:pPr>
+            <a:r>
+              <a:rPr lang="en-AU" sz="2000" dirty="0">
+                <a:latin typeface="Bangla MN" pitchFamily="2" charset="0"/>
+                <a:cs typeface="Bangla MN" pitchFamily="2" charset="0"/>
+              </a:rPr>
+              <a:t>Please</a:t>
+            </a:r>
+            <a:r>
+              <a:rPr lang="en-AU" sz="2000" b="1" dirty="0">
+                <a:latin typeface="Bangla MN" pitchFamily="2" charset="0"/>
+                <a:cs typeface="Bangla MN" pitchFamily="2" charset="0"/>
+              </a:rPr>
+              <a:t> do not cross your arms or legs </a:t>
+            </a:r>
+            <a:r>
+              <a:rPr lang="en-AU" sz="2000" dirty="0">
+                <a:latin typeface="Bangla MN" pitchFamily="2" charset="0"/>
+                <a:cs typeface="Bangla MN" pitchFamily="2" charset="0"/>
+              </a:rPr>
+              <a:t>throughout the scanning.</a:t>
             </a:r>
           </a:p>
           <a:p>
@@ -17931,6 +18171,17 @@
 </file>
 
 <file path=customXml/item1.xml><?xml version="1.0" encoding="utf-8"?>
+<p:properties xmlns:p="http://schemas.microsoft.com/office/2006/metadata/properties" xmlns:xsi="http://www.w3.org/2001/XMLSchema-instance" xmlns:pc="http://schemas.microsoft.com/office/infopath/2007/PartnerControls">
+  <documentManagement>
+    <lcf76f155ced4ddcb4097134ff3c332f xmlns="daf31937-5c4f-4e36-a8d9-626984e07ebd">
+      <Terms xmlns="http://schemas.microsoft.com/office/infopath/2007/PartnerControls"/>
+    </lcf76f155ced4ddcb4097134ff3c332f>
+    <TaxCatchAll xmlns="a8fd9021-eca3-4fd4-8026-6f227723cead" xsi:nil="true"/>
+  </documentManagement>
+</p:properties>
+</file>
+
+<file path=customXml/item2.xml><?xml version="1.0" encoding="utf-8"?>
 <ct:contentTypeSchema xmlns:ct="http://schemas.microsoft.com/office/2006/metadata/contentType" xmlns:ma="http://schemas.microsoft.com/office/2006/metadata/properties/metaAttributes" ct:_="" ma:_="" ma:contentTypeName="Document" ma:contentTypeID="0x010100B279BEA181066048B3FF76D28915822B" ma:contentTypeVersion="15" ma:contentTypeDescription="Create a new document." ma:contentTypeScope="" ma:versionID="f285cf715a0cf87a35bb60aebdc8b6c9">
   <xsd:schema xmlns:xsd="http://www.w3.org/2001/XMLSchema" xmlns:xs="http://www.w3.org/2001/XMLSchema" xmlns:p="http://schemas.microsoft.com/office/2006/metadata/properties" xmlns:ns2="daf31937-5c4f-4e36-a8d9-626984e07ebd" xmlns:ns3="a8fd9021-eca3-4fd4-8026-6f227723cead" targetNamespace="http://schemas.microsoft.com/office/2006/metadata/properties" ma:root="true" ma:fieldsID="744df078a4d9e9d5ba233b6f0f7abc7b" ns2:_="" ns3:_="">
     <xsd:import namespace="daf31937-5c4f-4e36-a8d9-626984e07ebd"/>
@@ -18167,7 +18418,7 @@
 </ct:contentTypeSchema>
 </file>
 
-<file path=customXml/item2.xml><?xml version="1.0" encoding="utf-8"?>
+<file path=customXml/item3.xml><?xml version="1.0" encoding="utf-8"?>
 <?mso-contentType ?>
 <FormTemplates xmlns="http://schemas.microsoft.com/sharepoint/v3/contenttype/forms">
   <Display>DocumentLibraryForm</Display>
@@ -18176,18 +18427,20 @@
 </FormTemplates>
 </file>
 
-<file path=customXml/item3.xml><?xml version="1.0" encoding="utf-8"?>
-<p:properties xmlns:p="http://schemas.microsoft.com/office/2006/metadata/properties" xmlns:xsi="http://www.w3.org/2001/XMLSchema-instance" xmlns:pc="http://schemas.microsoft.com/office/infopath/2007/PartnerControls">
-  <documentManagement>
-    <lcf76f155ced4ddcb4097134ff3c332f xmlns="daf31937-5c4f-4e36-a8d9-626984e07ebd">
-      <Terms xmlns="http://schemas.microsoft.com/office/infopath/2007/PartnerControls"/>
-    </lcf76f155ced4ddcb4097134ff3c332f>
-    <TaxCatchAll xmlns="a8fd9021-eca3-4fd4-8026-6f227723cead" xsi:nil="true"/>
-  </documentManagement>
-</p:properties>
+<file path=customXml/itemProps1.xml><?xml version="1.0" encoding="utf-8"?>
+<ds:datastoreItem xmlns:ds="http://schemas.openxmlformats.org/officeDocument/2006/customXml" ds:itemID="{132C877D-D064-4C92-9FDE-72E2677A4405}">
+  <ds:schemaRefs>
+    <ds:schemaRef ds:uri="a8fd9021-eca3-4fd4-8026-6f227723cead"/>
+    <ds:schemaRef ds:uri="daf31937-5c4f-4e36-a8d9-626984e07ebd"/>
+    <ds:schemaRef ds:uri="http://schemas.microsoft.com/office/2006/metadata/properties"/>
+    <ds:schemaRef ds:uri="http://schemas.microsoft.com/office/infopath/2007/PartnerControls"/>
+    <ds:schemaRef ds:uri="http://www.w3.org/2000/xmlns/"/>
+    <ds:schemaRef ds:uri="http://www.w3.org/2001/XMLSchema-instance"/>
+  </ds:schemaRefs>
+</ds:datastoreItem>
 </file>
 
-<file path=customXml/itemProps1.xml><?xml version="1.0" encoding="utf-8"?>
+<file path=customXml/itemProps2.xml><?xml version="1.0" encoding="utf-8"?>
 <ds:datastoreItem xmlns:ds="http://schemas.openxmlformats.org/officeDocument/2006/customXml" ds:itemID="{420A8D93-CDBB-4E16-A506-3D5059F87A4E}">
   <ds:schemaRefs>
     <ds:schemaRef ds:uri="http://schemas.microsoft.com/office/2006/metadata/contentType"/>
@@ -18206,23 +18459,10 @@
 </ds:datastoreItem>
 </file>
 
-<file path=customXml/itemProps2.xml><?xml version="1.0" encoding="utf-8"?>
+<file path=customXml/itemProps3.xml><?xml version="1.0" encoding="utf-8"?>
 <ds:datastoreItem xmlns:ds="http://schemas.openxmlformats.org/officeDocument/2006/customXml" ds:itemID="{51F62D99-D697-46FC-8163-15A227B0F065}">
   <ds:schemaRefs>
     <ds:schemaRef ds:uri="http://schemas.microsoft.com/sharepoint/v3/contenttype/forms"/>
   </ds:schemaRefs>
 </ds:datastoreItem>
-</file>
-
-<file path=customXml/itemProps3.xml><?xml version="1.0" encoding="utf-8"?>
-<ds:datastoreItem xmlns:ds="http://schemas.openxmlformats.org/officeDocument/2006/customXml" ds:itemID="{132C877D-D064-4C92-9FDE-72E2677A4405}">
-  <ds:schemaRefs>
-    <ds:schemaRef ds:uri="a8fd9021-eca3-4fd4-8026-6f227723cead"/>
-    <ds:schemaRef ds:uri="daf31937-5c4f-4e36-a8d9-626984e07ebd"/>
-    <ds:schemaRef ds:uri="http://schemas.microsoft.com/office/2006/metadata/properties"/>
-    <ds:schemaRef ds:uri="http://schemas.microsoft.com/office/infopath/2007/PartnerControls"/>
-    <ds:schemaRef ds:uri="http://www.w3.org/2000/xmlns/"/>
-    <ds:schemaRef ds:uri="http://www.w3.org/2001/XMLSchema-instance"/>
-  </ds:schemaRefs>
-</ds:datastoreItem>
 </file>
</xml_diff>